<commit_message>
Update PPT and spelling errors
</commit_message>
<xml_diff>
--- a/presentation/Data Science Portfolio_Lessa Fleming_2024.pptx
+++ b/presentation/Data Science Portfolio_Lessa Fleming_2024.pptx
@@ -207,7 +207,7 @@
           <a:p>
             <a:fld id="{EF0F579E-A334-405F-B81C-F0AA7397E7AE}" type="datetimeFigureOut">
               <a:rPr lang="en-US" smtClean="0"/>
-              <a:t>2/22/2024</a:t>
+              <a:t>3/8/2024</a:t>
             </a:fld>
             <a:endParaRPr lang="en-US"/>
           </a:p>
@@ -518,25 +518,9 @@
           <a:bodyPr/>
           <a:lstStyle/>
           <a:p>
-            <a:pPr marL="0" marR="0">
-              <a:lnSpc>
-                <a:spcPct val="107000"/>
-              </a:lnSpc>
-              <a:spcBef>
-                <a:spcPts val="0"/>
-              </a:spcBef>
-              <a:spcAft>
-                <a:spcPts val="800"/>
-              </a:spcAft>
-            </a:pPr>
             <a:r>
-              <a:rPr lang="en-US" sz="1800" kern="100" dirty="0">
-                <a:effectLst/>
-                <a:latin typeface="Calibri" panose="020F0502020204030204" pitchFamily="34" charset="0"/>
-                <a:ea typeface="Calibri" panose="020F0502020204030204" pitchFamily="34" charset="0"/>
-                <a:cs typeface="Times New Roman" panose="02020603050405020304" pitchFamily="18" charset="0"/>
-              </a:rPr>
-              <a:t>The health insurance charge project effectively fulfilled my learning requirements across multiple dimensions of data science. Demonstrating proficiency in data handling, I collected, stored, and accessed data, identifying dataset demographics and assessing the need for cleaning. Despite dataset limitations, I successfully extracted actionable insights regarding variables impacting insurance charges, showcasing my ability to generate insights across different contexts. Through regression modeling and visualization techniques, I was able to analyze the data to identify significant variables and convey insights visually, while also applying programming skills in R for data manipulation and model creation. By creating a Shiny app and developing a prediction function, I communicated insights to a broad audience, including non-technical users, thus meeting the requirement for communication. Though not explicitly mentioned, ethical considerations were taken into account, aligning with the need to apply ethics in data and predictive models. Overall, my project encompassed the entire data science life cycle, demonstrating the ability to handle data, derive insights, apply various techniques, communicate findings effectively, and consider ethical implications. </a:t>
+              <a:rPr lang="en-US" dirty="0"/>
+              <a:t>Welcome to my Data Science portfolio presentation. </a:t>
             </a:r>
           </a:p>
         </p:txBody>
@@ -558,7 +542,7 @@
           <a:p>
             <a:fld id="{A909A3FC-2393-4273-9AC7-EDC993986798}" type="slidenum">
               <a:rPr lang="en-US" smtClean="0"/>
-              <a:t>6</a:t>
+              <a:t>1</a:t>
             </a:fld>
             <a:endParaRPr lang="en-US"/>
           </a:p>
@@ -567,7 +551,7 @@
     </p:spTree>
     <p:extLst>
       <p:ext uri="{BB962C8B-B14F-4D97-AF65-F5344CB8AC3E}">
-        <p14:creationId xmlns:p14="http://schemas.microsoft.com/office/powerpoint/2010/main" val="2003929635"/>
+        <p14:creationId xmlns:p14="http://schemas.microsoft.com/office/powerpoint/2010/main" val="3766287761"/>
       </p:ext>
     </p:extLst>
   </p:cSld>
@@ -577,358 +561,7 @@
 </p:notes>
 </file>
 
-<file path=ppt/notesSlides/notesSlide2.xml><?xml version="1.0" encoding="utf-8"?>
-<p:notes xmlns:a="http://schemas.openxmlformats.org/drawingml/2006/main" xmlns:r="http://schemas.openxmlformats.org/officeDocument/2006/relationships" xmlns:p="http://schemas.openxmlformats.org/presentationml/2006/main">
-  <p:cSld>
-    <p:spTree>
-      <p:nvGrpSpPr>
-        <p:cNvPr id="1" name=""/>
-        <p:cNvGrpSpPr/>
-        <p:nvPr/>
-      </p:nvGrpSpPr>
-      <p:grpSpPr>
-        <a:xfrm>
-          <a:off x="0" y="0"/>
-          <a:ext cx="0" cy="0"/>
-          <a:chOff x="0" y="0"/>
-          <a:chExt cx="0" cy="0"/>
-        </a:xfrm>
-      </p:grpSpPr>
-      <p:sp>
-        <p:nvSpPr>
-          <p:cNvPr id="2" name="Slide Image Placeholder 1"/>
-          <p:cNvSpPr>
-            <a:spLocks noGrp="1" noRot="1" noChangeAspect="1"/>
-          </p:cNvSpPr>
-          <p:nvPr>
-            <p:ph type="sldImg"/>
-          </p:nvPr>
-        </p:nvSpPr>
-        <p:spPr/>
-      </p:sp>
-      <p:sp>
-        <p:nvSpPr>
-          <p:cNvPr id="3" name="Notes Placeholder 2"/>
-          <p:cNvSpPr>
-            <a:spLocks noGrp="1"/>
-          </p:cNvSpPr>
-          <p:nvPr>
-            <p:ph type="body" idx="1"/>
-          </p:nvPr>
-        </p:nvSpPr>
-        <p:spPr/>
-        <p:txBody>
-          <a:bodyPr/>
-          <a:lstStyle/>
-          <a:p>
-            <a:pPr marL="0" marR="0" lvl="0" indent="0" algn="l" defTabSz="914400" rtl="0" eaLnBrk="1" fontAlgn="auto" latinLnBrk="0" hangingPunct="1">
-              <a:lnSpc>
-                <a:spcPct val="100000"/>
-              </a:lnSpc>
-              <a:spcBef>
-                <a:spcPts val="0"/>
-              </a:spcBef>
-              <a:spcAft>
-                <a:spcPts val="0"/>
-              </a:spcAft>
-              <a:buClrTx/>
-              <a:buSzTx/>
-              <a:buFontTx/>
-              <a:buNone/>
-              <a:tabLst/>
-              <a:defRPr/>
-            </a:pPr>
-            <a:r>
-              <a:rPr lang="en-US" sz="1800" kern="100" dirty="0">
-                <a:effectLst/>
-                <a:latin typeface="Calibri" panose="020F0502020204030204" pitchFamily="34" charset="0"/>
-                <a:ea typeface="Calibri" panose="020F0502020204030204" pitchFamily="34" charset="0"/>
-                <a:cs typeface="Times New Roman" panose="02020603050405020304" pitchFamily="18" charset="0"/>
-              </a:rPr>
-              <a:t>This project centered on analyzing two Airbnb datasets from Kaggle, this project met my learning requirements in several key aspects. Beginning with data handling and management, I was able to efficiently process the datasets, distinguishing between the AB_US and Combined Europe datasets and managing their large size by creating a sampled version for analysis. Utilizing </a:t>
-            </a:r>
-            <a:r>
-              <a:rPr lang="en-US" sz="1800" kern="100" dirty="0" err="1">
-                <a:effectLst/>
-                <a:latin typeface="Calibri" panose="020F0502020204030204" pitchFamily="34" charset="0"/>
-                <a:ea typeface="Calibri" panose="020F0502020204030204" pitchFamily="34" charset="0"/>
-                <a:cs typeface="Times New Roman" panose="02020603050405020304" pitchFamily="18" charset="0"/>
-              </a:rPr>
-              <a:t>Jupyter</a:t>
-            </a:r>
-            <a:r>
-              <a:rPr lang="en-US" sz="1800" kern="100" dirty="0">
-                <a:effectLst/>
-                <a:latin typeface="Calibri" panose="020F0502020204030204" pitchFamily="34" charset="0"/>
-                <a:ea typeface="Calibri" panose="020F0502020204030204" pitchFamily="34" charset="0"/>
-                <a:cs typeface="Times New Roman" panose="02020603050405020304" pitchFamily="18" charset="0"/>
-              </a:rPr>
-              <a:t> notebooks, I organized the data into separate data frames for analysis. Through data cleaning and manipulation, I ensured that only relevant columns were retained and appropriately renamed for clarity, exemplifying proficiency in data preprocessing. Employing descriptive statistics, scatter plots, correlation analysis, and pivot tables, I explored the relationships between variables such as price, location, and customer satisfaction, demonstrating a comprehensive understanding and application of visualization and analytical techniques. Furthermore, I effectively communicated the project findings and insights, drawing conclusions about Airbnb rental trends in different geographical contexts, such as the impact of location proximity to metro stations on rental types in Europe and the influence of city, availability, and price on rental bookings and customer satisfaction. Overall, this project exemplifies a robust application of data science principles and techniques, aligning closely with the learning requirements and showcasing my ability to derive actionable insights from complex datasets.</a:t>
-            </a:r>
-          </a:p>
-          <a:p>
-            <a:endParaRPr lang="en-US" dirty="0"/>
-          </a:p>
-        </p:txBody>
-      </p:sp>
-      <p:sp>
-        <p:nvSpPr>
-          <p:cNvPr id="4" name="Slide Number Placeholder 3"/>
-          <p:cNvSpPr>
-            <a:spLocks noGrp="1"/>
-          </p:cNvSpPr>
-          <p:nvPr>
-            <p:ph type="sldNum" sz="quarter" idx="5"/>
-          </p:nvPr>
-        </p:nvSpPr>
-        <p:spPr/>
-        <p:txBody>
-          <a:bodyPr/>
-          <a:lstStyle/>
-          <a:p>
-            <a:fld id="{A909A3FC-2393-4273-9AC7-EDC993986798}" type="slidenum">
-              <a:rPr lang="en-US" smtClean="0"/>
-              <a:t>7</a:t>
-            </a:fld>
-            <a:endParaRPr lang="en-US"/>
-          </a:p>
-        </p:txBody>
-      </p:sp>
-    </p:spTree>
-    <p:extLst>
-      <p:ext uri="{BB962C8B-B14F-4D97-AF65-F5344CB8AC3E}">
-        <p14:creationId xmlns:p14="http://schemas.microsoft.com/office/powerpoint/2010/main" val="1322968924"/>
-      </p:ext>
-    </p:extLst>
-  </p:cSld>
-  <p:clrMapOvr>
-    <a:masterClrMapping/>
-  </p:clrMapOvr>
-</p:notes>
-</file>
-
-<file path=ppt/notesSlides/notesSlide3.xml><?xml version="1.0" encoding="utf-8"?>
-<p:notes xmlns:a="http://schemas.openxmlformats.org/drawingml/2006/main" xmlns:r="http://schemas.openxmlformats.org/officeDocument/2006/relationships" xmlns:p="http://schemas.openxmlformats.org/presentationml/2006/main">
-  <p:cSld>
-    <p:spTree>
-      <p:nvGrpSpPr>
-        <p:cNvPr id="1" name=""/>
-        <p:cNvGrpSpPr/>
-        <p:nvPr/>
-      </p:nvGrpSpPr>
-      <p:grpSpPr>
-        <a:xfrm>
-          <a:off x="0" y="0"/>
-          <a:ext cx="0" cy="0"/>
-          <a:chOff x="0" y="0"/>
-          <a:chExt cx="0" cy="0"/>
-        </a:xfrm>
-      </p:grpSpPr>
-      <p:sp>
-        <p:nvSpPr>
-          <p:cNvPr id="2" name="Slide Image Placeholder 1"/>
-          <p:cNvSpPr>
-            <a:spLocks noGrp="1" noRot="1" noChangeAspect="1"/>
-          </p:cNvSpPr>
-          <p:nvPr>
-            <p:ph type="sldImg"/>
-          </p:nvPr>
-        </p:nvSpPr>
-        <p:spPr/>
-      </p:sp>
-      <p:sp>
-        <p:nvSpPr>
-          <p:cNvPr id="3" name="Notes Placeholder 2"/>
-          <p:cNvSpPr>
-            <a:spLocks noGrp="1"/>
-          </p:cNvSpPr>
-          <p:nvPr>
-            <p:ph type="body" idx="1"/>
-          </p:nvPr>
-        </p:nvSpPr>
-        <p:spPr/>
-        <p:txBody>
-          <a:bodyPr/>
-          <a:lstStyle/>
-          <a:p>
-            <a:pPr marL="0" marR="0" lvl="0" indent="0" algn="l" defTabSz="914400" rtl="0" eaLnBrk="1" fontAlgn="auto" latinLnBrk="0" hangingPunct="1">
-              <a:lnSpc>
-                <a:spcPct val="100000"/>
-              </a:lnSpc>
-              <a:spcBef>
-                <a:spcPts val="0"/>
-              </a:spcBef>
-              <a:spcAft>
-                <a:spcPts val="0"/>
-              </a:spcAft>
-              <a:buClrTx/>
-              <a:buSzTx/>
-              <a:buFontTx/>
-              <a:buNone/>
-              <a:tabLst/>
-              <a:defRPr/>
-            </a:pPr>
-            <a:r>
-              <a:rPr lang="en-US" sz="1800" kern="100" dirty="0">
-                <a:effectLst/>
-                <a:latin typeface="Calibri" panose="020F0502020204030204" pitchFamily="34" charset="0"/>
-                <a:ea typeface="Calibri" panose="020F0502020204030204" pitchFamily="34" charset="0"/>
-                <a:cs typeface="Times New Roman" panose="02020603050405020304" pitchFamily="18" charset="0"/>
-              </a:rPr>
-              <a:t>For my Machine Learning project I focused on analyzing a dataset of Data Science salaries from 2019 to 2022 sourced from Kaggle, this project helped to demonstrate my ability to use multiple analysis methods to predict future salaries and inform negotiation strategies for Data Scientist roles. Despite encountering challenges with the initial dataset, which necessitated the use of a replacement dataset, I was able to prepare the data, ensuring it was clean and structured for analysis in R. Through descriptive statistics, I gained insights into the distribution and trends of salaries across different years, identifying notable increases in mean salaries over time. Utilizing visualization techniques such as histograms, density charts, and word clouds, I further elucidated salary distributions and key terms in job descriptions. Moving into data mining, I  applied probability tables and machine learning models such as Naïve Bayes and decision trees to predict future salaries and determine optimal negotiation strategies. The analysis revealed steady increases in Data Scientist salaries year over year, with significant variations in average salaries across cities. Ultimately, the prediction analysis suggests a negotiated salary range for 2023 between $124,671 and $134,671, providing valuable insights for individuals seeking Data Science roles. Overall, this project demonstrates a comprehensive application of data science techniques to address real-world questions and inform decision-making in a professional context.</a:t>
-            </a:r>
-          </a:p>
-        </p:txBody>
-      </p:sp>
-      <p:sp>
-        <p:nvSpPr>
-          <p:cNvPr id="4" name="Slide Number Placeholder 3"/>
-          <p:cNvSpPr>
-            <a:spLocks noGrp="1"/>
-          </p:cNvSpPr>
-          <p:nvPr>
-            <p:ph type="sldNum" sz="quarter" idx="5"/>
-          </p:nvPr>
-        </p:nvSpPr>
-        <p:spPr/>
-        <p:txBody>
-          <a:bodyPr/>
-          <a:lstStyle/>
-          <a:p>
-            <a:fld id="{A909A3FC-2393-4273-9AC7-EDC993986798}" type="slidenum">
-              <a:rPr lang="en-US" smtClean="0"/>
-              <a:t>8</a:t>
-            </a:fld>
-            <a:endParaRPr lang="en-US"/>
-          </a:p>
-        </p:txBody>
-      </p:sp>
-    </p:spTree>
-    <p:extLst>
-      <p:ext uri="{BB962C8B-B14F-4D97-AF65-F5344CB8AC3E}">
-        <p14:creationId xmlns:p14="http://schemas.microsoft.com/office/powerpoint/2010/main" val="1715172633"/>
-      </p:ext>
-    </p:extLst>
-  </p:cSld>
-  <p:clrMapOvr>
-    <a:masterClrMapping/>
-  </p:clrMapOvr>
-</p:notes>
-</file>
-
-<file path=ppt/notesSlides/notesSlide4.xml><?xml version="1.0" encoding="utf-8"?>
-<p:notes xmlns:a="http://schemas.openxmlformats.org/drawingml/2006/main" xmlns:r="http://schemas.openxmlformats.org/officeDocument/2006/relationships" xmlns:p="http://schemas.openxmlformats.org/presentationml/2006/main">
-  <p:cSld>
-    <p:spTree>
-      <p:nvGrpSpPr>
-        <p:cNvPr id="1" name=""/>
-        <p:cNvGrpSpPr/>
-        <p:nvPr/>
-      </p:nvGrpSpPr>
-      <p:grpSpPr>
-        <a:xfrm>
-          <a:off x="0" y="0"/>
-          <a:ext cx="0" cy="0"/>
-          <a:chOff x="0" y="0"/>
-          <a:chExt cx="0" cy="0"/>
-        </a:xfrm>
-      </p:grpSpPr>
-      <p:sp>
-        <p:nvSpPr>
-          <p:cNvPr id="2" name="Slide Image Placeholder 1"/>
-          <p:cNvSpPr>
-            <a:spLocks noGrp="1" noRot="1" noChangeAspect="1"/>
-          </p:cNvSpPr>
-          <p:nvPr>
-            <p:ph type="sldImg"/>
-          </p:nvPr>
-        </p:nvSpPr>
-        <p:spPr/>
-      </p:sp>
-      <p:sp>
-        <p:nvSpPr>
-          <p:cNvPr id="3" name="Notes Placeholder 2"/>
-          <p:cNvSpPr>
-            <a:spLocks noGrp="1"/>
-          </p:cNvSpPr>
-          <p:nvPr>
-            <p:ph type="body" idx="1"/>
-          </p:nvPr>
-        </p:nvSpPr>
-        <p:spPr/>
-        <p:txBody>
-          <a:bodyPr/>
-          <a:lstStyle/>
-          <a:p>
-            <a:pPr marL="0" marR="0" lvl="0" indent="0" algn="l" defTabSz="914400" rtl="0" eaLnBrk="1" fontAlgn="auto" latinLnBrk="0" hangingPunct="1">
-              <a:lnSpc>
-                <a:spcPct val="100000"/>
-              </a:lnSpc>
-              <a:spcBef>
-                <a:spcPts val="0"/>
-              </a:spcBef>
-              <a:spcAft>
-                <a:spcPts val="0"/>
-              </a:spcAft>
-              <a:buClrTx/>
-              <a:buSzTx/>
-              <a:buFontTx/>
-              <a:buNone/>
-              <a:tabLst/>
-              <a:defRPr/>
-            </a:pPr>
-            <a:r>
-              <a:rPr lang="en-US" sz="1800" kern="100" dirty="0">
-                <a:effectLst/>
-                <a:latin typeface="Calibri" panose="020F0502020204030204" pitchFamily="34" charset="0"/>
-                <a:ea typeface="Calibri" panose="020F0502020204030204" pitchFamily="34" charset="0"/>
-                <a:cs typeface="Times New Roman" panose="02020603050405020304" pitchFamily="18" charset="0"/>
-              </a:rPr>
-              <a:t>For the Big Data Analytics class my project centered on the analysis of two datasets regarding honeybee production and colony loss, effectively addressing critical issues related to declining bee populations and its implications. Through meticulous examination, it was observed that the overall number of colonies, honeybee production, and beekeepers are experiencing a consistent decline, posing significant ecological concerns. To address these challenges, a recommendation is proposed to allocate funding for incentivizing beekeeping and bee-saving initiatives, aiming to bolster beekeeping efforts and mitigate colony losses. By enhancing the quantity and quality of beekeeping practices, it is anticipated that the number of colonies and honey production can be positively impacted. Furthermore, considering the correlation between production levels and honey prices, such incentives could lead to potential cost reductions in the future. The project's research questions encompass various aspects, including trends in colony loss, honey production, price fluctuations, and predictive analysis by state. Hypotheses were formulated to explore these questions, anticipating trends such as increasing colony losses and declining honey production over time. Two datasets were utilized, retrieved from Kaggle, each providing valuable insights into colony loss, honey production, and related factors across different states and years. Notable findings include the prevalence of colony loss and declining honey production trends, particularly evident from 2011 to 2017. Despite challenges in fitting ARIMA models for predictive analysis, the project still discerned significant trends, indicating the likelihood of continued colony losses and their far-reaching consequences. Ultimately, the recommendation for funding incentivized beekeeping initiatives emerges as a crucial step towards safeguarding the bee population and maintaining a healthy ecosystem. Through this proactive approach, the project underscores the importance of collective efforts in addressing the pressing issue of declining bee populations and its broader ecological impact. My project encompasses various aspects of data analysis, visualization, prediction, and communication, showcasing proficiency in addressing real-world problems using R while considering ethical implications and communicating findings effectively to stakeholders.</a:t>
-            </a:r>
-          </a:p>
-          <a:p>
-            <a:endParaRPr lang="en-US" dirty="0"/>
-          </a:p>
-        </p:txBody>
-      </p:sp>
-      <p:sp>
-        <p:nvSpPr>
-          <p:cNvPr id="4" name="Slide Number Placeholder 3"/>
-          <p:cNvSpPr>
-            <a:spLocks noGrp="1"/>
-          </p:cNvSpPr>
-          <p:nvPr>
-            <p:ph type="sldNum" sz="quarter" idx="5"/>
-          </p:nvPr>
-        </p:nvSpPr>
-        <p:spPr/>
-        <p:txBody>
-          <a:bodyPr/>
-          <a:lstStyle/>
-          <a:p>
-            <a:fld id="{A909A3FC-2393-4273-9AC7-EDC993986798}" type="slidenum">
-              <a:rPr lang="en-US" smtClean="0"/>
-              <a:t>9</a:t>
-            </a:fld>
-            <a:endParaRPr lang="en-US"/>
-          </a:p>
-        </p:txBody>
-      </p:sp>
-    </p:spTree>
-    <p:extLst>
-      <p:ext uri="{BB962C8B-B14F-4D97-AF65-F5344CB8AC3E}">
-        <p14:creationId xmlns:p14="http://schemas.microsoft.com/office/powerpoint/2010/main" val="3388718160"/>
-      </p:ext>
-    </p:extLst>
-  </p:cSld>
-  <p:clrMapOvr>
-    <a:masterClrMapping/>
-  </p:clrMapOvr>
-</p:notes>
-</file>
-
-<file path=ppt/notesSlides/notesSlide5.xml><?xml version="1.0" encoding="utf-8"?>
+<file path=ppt/notesSlides/notesSlide10.xml><?xml version="1.0" encoding="utf-8"?>
 <p:notes xmlns:a="http://schemas.openxmlformats.org/drawingml/2006/main" xmlns:r="http://schemas.openxmlformats.org/officeDocument/2006/relationships" xmlns:p="http://schemas.openxmlformats.org/presentationml/2006/main">
   <p:cSld>
     <p:spTree>
@@ -1082,6 +715,464 @@
 </p:notes>
 </file>
 
+<file path=ppt/notesSlides/notesSlide11.xml><?xml version="1.0" encoding="utf-8"?>
+<p:notes xmlns:a="http://schemas.openxmlformats.org/drawingml/2006/main" xmlns:r="http://schemas.openxmlformats.org/officeDocument/2006/relationships" xmlns:p="http://schemas.openxmlformats.org/presentationml/2006/main">
+  <p:cSld>
+    <p:spTree>
+      <p:nvGrpSpPr>
+        <p:cNvPr id="1" name=""/>
+        <p:cNvGrpSpPr/>
+        <p:nvPr/>
+      </p:nvGrpSpPr>
+      <p:grpSpPr>
+        <a:xfrm>
+          <a:off x="0" y="0"/>
+          <a:ext cx="0" cy="0"/>
+          <a:chOff x="0" y="0"/>
+          <a:chExt cx="0" cy="0"/>
+        </a:xfrm>
+      </p:grpSpPr>
+      <p:sp>
+        <p:nvSpPr>
+          <p:cNvPr id="2" name="Slide Image Placeholder 1"/>
+          <p:cNvSpPr>
+            <a:spLocks noGrp="1" noRot="1" noChangeAspect="1"/>
+          </p:cNvSpPr>
+          <p:nvPr>
+            <p:ph type="sldImg"/>
+          </p:nvPr>
+        </p:nvSpPr>
+        <p:spPr/>
+      </p:sp>
+      <p:sp>
+        <p:nvSpPr>
+          <p:cNvPr id="3" name="Notes Placeholder 2"/>
+          <p:cNvSpPr>
+            <a:spLocks noGrp="1"/>
+          </p:cNvSpPr>
+          <p:nvPr>
+            <p:ph type="body" idx="1"/>
+          </p:nvPr>
+        </p:nvSpPr>
+        <p:spPr/>
+        <p:txBody>
+          <a:bodyPr/>
+          <a:lstStyle/>
+          <a:p>
+            <a:r>
+              <a:rPr lang="en-US" b="0" i="0" dirty="0">
+                <a:solidFill>
+                  <a:srgbClr val="ECECEC"/>
+                </a:solidFill>
+                <a:effectLst/>
+                <a:latin typeface="Söhne"/>
+              </a:rPr>
+              <a:t>Through the completion of various projects spanning different domains such as analytics, data science, and weather forecasting, I have gained valuable insights and skills that directly align with my learning requirements. These projects have enabled me to proficiently collect, clean, and analyze diverse datasets using programming languages like R and Python, fulfilling the need to leverage applicable technologies for data manipulation and analysis. By applying visualization techniques and predictive models, I have successfully generated actionable insights across different contexts, from societal issues like honeybee population decline to business analytics in predicting data science salaries. Additionally, communicating these insights effectively to diverse audiences, including project sponsors and technical team leads, has been a crucial aspect of these projects, contributing to my ability to articulate findings clearly and persuasively. Furthermore, these projects have underscored the importance of ethical considerations in the development and use of data and predictive models, ensuring fairness, transparency, and privacy in my analyses. Overall, these projects have provided me with a comprehensive understanding of the data science lifecycle, from data collection to prediction, and have equipped me with the skills and knowledge necessary to address real-world challenges across various domains while upholding ethical standards.</a:t>
+            </a:r>
+            <a:endParaRPr lang="en-US" dirty="0"/>
+          </a:p>
+        </p:txBody>
+      </p:sp>
+      <p:sp>
+        <p:nvSpPr>
+          <p:cNvPr id="4" name="Slide Number Placeholder 3"/>
+          <p:cNvSpPr>
+            <a:spLocks noGrp="1"/>
+          </p:cNvSpPr>
+          <p:nvPr>
+            <p:ph type="sldNum" sz="quarter" idx="5"/>
+          </p:nvPr>
+        </p:nvSpPr>
+        <p:spPr/>
+        <p:txBody>
+          <a:bodyPr/>
+          <a:lstStyle/>
+          <a:p>
+            <a:fld id="{A909A3FC-2393-4273-9AC7-EDC993986798}" type="slidenum">
+              <a:rPr lang="en-US" smtClean="0"/>
+              <a:t>11</a:t>
+            </a:fld>
+            <a:endParaRPr lang="en-US"/>
+          </a:p>
+        </p:txBody>
+      </p:sp>
+    </p:spTree>
+    <p:extLst>
+      <p:ext uri="{BB962C8B-B14F-4D97-AF65-F5344CB8AC3E}">
+        <p14:creationId xmlns:p14="http://schemas.microsoft.com/office/powerpoint/2010/main" val="2249626278"/>
+      </p:ext>
+    </p:extLst>
+  </p:cSld>
+  <p:clrMapOvr>
+    <a:masterClrMapping/>
+  </p:clrMapOvr>
+</p:notes>
+</file>
+
+<file path=ppt/notesSlides/notesSlide2.xml><?xml version="1.0" encoding="utf-8"?>
+<p:notes xmlns:a="http://schemas.openxmlformats.org/drawingml/2006/main" xmlns:r="http://schemas.openxmlformats.org/officeDocument/2006/relationships" xmlns:p="http://schemas.openxmlformats.org/presentationml/2006/main">
+  <p:cSld>
+    <p:spTree>
+      <p:nvGrpSpPr>
+        <p:cNvPr id="1" name=""/>
+        <p:cNvGrpSpPr/>
+        <p:nvPr/>
+      </p:nvGrpSpPr>
+      <p:grpSpPr>
+        <a:xfrm>
+          <a:off x="0" y="0"/>
+          <a:ext cx="0" cy="0"/>
+          <a:chOff x="0" y="0"/>
+          <a:chExt cx="0" cy="0"/>
+        </a:xfrm>
+      </p:grpSpPr>
+      <p:sp>
+        <p:nvSpPr>
+          <p:cNvPr id="2" name="Slide Image Placeholder 1"/>
+          <p:cNvSpPr>
+            <a:spLocks noGrp="1" noRot="1" noChangeAspect="1"/>
+          </p:cNvSpPr>
+          <p:nvPr>
+            <p:ph type="sldImg"/>
+          </p:nvPr>
+        </p:nvSpPr>
+        <p:spPr/>
+      </p:sp>
+      <p:sp>
+        <p:nvSpPr>
+          <p:cNvPr id="3" name="Notes Placeholder 2"/>
+          <p:cNvSpPr>
+            <a:spLocks noGrp="1"/>
+          </p:cNvSpPr>
+          <p:nvPr>
+            <p:ph type="body" idx="1"/>
+          </p:nvPr>
+        </p:nvSpPr>
+        <p:spPr/>
+        <p:txBody>
+          <a:bodyPr/>
+          <a:lstStyle/>
+          <a:p>
+            <a:r>
+              <a:rPr lang="en-US" dirty="0"/>
+              <a:t>In this presentation, we will be covering the learning objectives for the Masters of Applied Data Science program. We will review the projects that I have completed in this program and their business applications. </a:t>
+            </a:r>
+          </a:p>
+        </p:txBody>
+      </p:sp>
+      <p:sp>
+        <p:nvSpPr>
+          <p:cNvPr id="4" name="Slide Number Placeholder 3"/>
+          <p:cNvSpPr>
+            <a:spLocks noGrp="1"/>
+          </p:cNvSpPr>
+          <p:nvPr>
+            <p:ph type="sldNum" sz="quarter" idx="5"/>
+          </p:nvPr>
+        </p:nvSpPr>
+        <p:spPr/>
+        <p:txBody>
+          <a:bodyPr/>
+          <a:lstStyle/>
+          <a:p>
+            <a:fld id="{A909A3FC-2393-4273-9AC7-EDC993986798}" type="slidenum">
+              <a:rPr lang="en-US" smtClean="0"/>
+              <a:t>2</a:t>
+            </a:fld>
+            <a:endParaRPr lang="en-US"/>
+          </a:p>
+        </p:txBody>
+      </p:sp>
+    </p:spTree>
+    <p:extLst>
+      <p:ext uri="{BB962C8B-B14F-4D97-AF65-F5344CB8AC3E}">
+        <p14:creationId xmlns:p14="http://schemas.microsoft.com/office/powerpoint/2010/main" val="3568089539"/>
+      </p:ext>
+    </p:extLst>
+  </p:cSld>
+  <p:clrMapOvr>
+    <a:masterClrMapping/>
+  </p:clrMapOvr>
+</p:notes>
+</file>
+
+<file path=ppt/notesSlides/notesSlide3.xml><?xml version="1.0" encoding="utf-8"?>
+<p:notes xmlns:a="http://schemas.openxmlformats.org/drawingml/2006/main" xmlns:r="http://schemas.openxmlformats.org/officeDocument/2006/relationships" xmlns:p="http://schemas.openxmlformats.org/presentationml/2006/main">
+  <p:cSld>
+    <p:spTree>
+      <p:nvGrpSpPr>
+        <p:cNvPr id="1" name=""/>
+        <p:cNvGrpSpPr/>
+        <p:nvPr/>
+      </p:nvGrpSpPr>
+      <p:grpSpPr>
+        <a:xfrm>
+          <a:off x="0" y="0"/>
+          <a:ext cx="0" cy="0"/>
+          <a:chOff x="0" y="0"/>
+          <a:chExt cx="0" cy="0"/>
+        </a:xfrm>
+      </p:grpSpPr>
+      <p:sp>
+        <p:nvSpPr>
+          <p:cNvPr id="2" name="Slide Image Placeholder 1"/>
+          <p:cNvSpPr>
+            <a:spLocks noGrp="1" noRot="1" noChangeAspect="1"/>
+          </p:cNvSpPr>
+          <p:nvPr>
+            <p:ph type="sldImg"/>
+          </p:nvPr>
+        </p:nvSpPr>
+        <p:spPr/>
+      </p:sp>
+      <p:sp>
+        <p:nvSpPr>
+          <p:cNvPr id="3" name="Notes Placeholder 2"/>
+          <p:cNvSpPr>
+            <a:spLocks noGrp="1"/>
+          </p:cNvSpPr>
+          <p:nvPr>
+            <p:ph type="body" idx="1"/>
+          </p:nvPr>
+        </p:nvSpPr>
+        <p:spPr/>
+        <p:txBody>
+          <a:bodyPr/>
+          <a:lstStyle/>
+          <a:p>
+            <a:r>
+              <a:rPr lang="en-US" dirty="0"/>
+              <a:t>My name is Lessa Fleming, I was born in Syracuse NY, and lived there up until 3 years ago when I moved to South Carolina. I currently have an associates in paralegal studies and a bachelor’s in computer science from Rasmussen University. I started my journey with plans to become a lawyer when I realized my passion for data and analytics while obtaining my Computer Science degree. This led me to SU to pursue my master’s in Applied Data Science. I continued to pursue this passion by moving into a technical analyst role, and now a senior claims business process consultant working in Oracle.. </a:t>
+            </a:r>
+          </a:p>
+        </p:txBody>
+      </p:sp>
+      <p:sp>
+        <p:nvSpPr>
+          <p:cNvPr id="4" name="Slide Number Placeholder 3"/>
+          <p:cNvSpPr>
+            <a:spLocks noGrp="1"/>
+          </p:cNvSpPr>
+          <p:nvPr>
+            <p:ph type="sldNum" sz="quarter" idx="5"/>
+          </p:nvPr>
+        </p:nvSpPr>
+        <p:spPr/>
+        <p:txBody>
+          <a:bodyPr/>
+          <a:lstStyle/>
+          <a:p>
+            <a:fld id="{A909A3FC-2393-4273-9AC7-EDC993986798}" type="slidenum">
+              <a:rPr lang="en-US" smtClean="0"/>
+              <a:t>3</a:t>
+            </a:fld>
+            <a:endParaRPr lang="en-US"/>
+          </a:p>
+        </p:txBody>
+      </p:sp>
+    </p:spTree>
+    <p:extLst>
+      <p:ext uri="{BB962C8B-B14F-4D97-AF65-F5344CB8AC3E}">
+        <p14:creationId xmlns:p14="http://schemas.microsoft.com/office/powerpoint/2010/main" val="1404503346"/>
+      </p:ext>
+    </p:extLst>
+  </p:cSld>
+  <p:clrMapOvr>
+    <a:masterClrMapping/>
+  </p:clrMapOvr>
+</p:notes>
+</file>
+
+<file path=ppt/notesSlides/notesSlide4.xml><?xml version="1.0" encoding="utf-8"?>
+<p:notes xmlns:a="http://schemas.openxmlformats.org/drawingml/2006/main" xmlns:r="http://schemas.openxmlformats.org/officeDocument/2006/relationships" xmlns:p="http://schemas.openxmlformats.org/presentationml/2006/main">
+  <p:cSld>
+    <p:spTree>
+      <p:nvGrpSpPr>
+        <p:cNvPr id="1" name=""/>
+        <p:cNvGrpSpPr/>
+        <p:nvPr/>
+      </p:nvGrpSpPr>
+      <p:grpSpPr>
+        <a:xfrm>
+          <a:off x="0" y="0"/>
+          <a:ext cx="0" cy="0"/>
+          <a:chOff x="0" y="0"/>
+          <a:chExt cx="0" cy="0"/>
+        </a:xfrm>
+      </p:grpSpPr>
+      <p:sp>
+        <p:nvSpPr>
+          <p:cNvPr id="2" name="Slide Image Placeholder 1"/>
+          <p:cNvSpPr>
+            <a:spLocks noGrp="1" noRot="1" noChangeAspect="1"/>
+          </p:cNvSpPr>
+          <p:nvPr>
+            <p:ph type="sldImg"/>
+          </p:nvPr>
+        </p:nvSpPr>
+        <p:spPr/>
+      </p:sp>
+      <p:sp>
+        <p:nvSpPr>
+          <p:cNvPr id="3" name="Notes Placeholder 2"/>
+          <p:cNvSpPr>
+            <a:spLocks noGrp="1"/>
+          </p:cNvSpPr>
+          <p:nvPr>
+            <p:ph type="body" idx="1"/>
+          </p:nvPr>
+        </p:nvSpPr>
+        <p:spPr/>
+        <p:txBody>
+          <a:bodyPr/>
+          <a:lstStyle/>
+          <a:p>
+            <a:r>
+              <a:rPr lang="en-US" sz="1200" b="0" kern="1200" dirty="0">
+                <a:solidFill>
+                  <a:schemeClr val="tx2"/>
+                </a:solidFill>
+                <a:effectLst/>
+                <a:latin typeface="+mj-lt"/>
+                <a:ea typeface="+mj-ea"/>
+                <a:cs typeface="+mj-cs"/>
+              </a:rPr>
+              <a:t>Syracuse University’s Applied Data Science program is a program that works with two schools of study to prepare a student upon graduation to gain insights from data and provide actionable feedback on those insights. I</a:t>
+            </a:r>
+            <a:r>
+              <a:rPr lang="en-US" b="0" i="0" dirty="0">
+                <a:solidFill>
+                  <a:srgbClr val="ECECEC"/>
+                </a:solidFill>
+                <a:effectLst/>
+                <a:latin typeface="Söhne"/>
+              </a:rPr>
+              <a:t> took a strategic approach to my data science education, focusing on analytics and visualizations to gain valuable insights from data. By choosing machine learning, analytics, and learning multiple scripting languages, I’ve widened my scope for potential career paths in analytics. My choice to move into visualization courses was done to not only uncover insights but also effectively present them. This approach I felt gave me a diverse skill set that would make me stand out as a candidate and open many career paths.</a:t>
+            </a:r>
+            <a:endParaRPr lang="en-US" b="0" dirty="0"/>
+          </a:p>
+        </p:txBody>
+      </p:sp>
+      <p:sp>
+        <p:nvSpPr>
+          <p:cNvPr id="4" name="Slide Number Placeholder 3"/>
+          <p:cNvSpPr>
+            <a:spLocks noGrp="1"/>
+          </p:cNvSpPr>
+          <p:nvPr>
+            <p:ph type="sldNum" sz="quarter" idx="5"/>
+          </p:nvPr>
+        </p:nvSpPr>
+        <p:spPr/>
+        <p:txBody>
+          <a:bodyPr/>
+          <a:lstStyle/>
+          <a:p>
+            <a:fld id="{A909A3FC-2393-4273-9AC7-EDC993986798}" type="slidenum">
+              <a:rPr lang="en-US" smtClean="0"/>
+              <a:t>4</a:t>
+            </a:fld>
+            <a:endParaRPr lang="en-US"/>
+          </a:p>
+        </p:txBody>
+      </p:sp>
+    </p:spTree>
+    <p:extLst>
+      <p:ext uri="{BB962C8B-B14F-4D97-AF65-F5344CB8AC3E}">
+        <p14:creationId xmlns:p14="http://schemas.microsoft.com/office/powerpoint/2010/main" val="721553853"/>
+      </p:ext>
+    </p:extLst>
+  </p:cSld>
+  <p:clrMapOvr>
+    <a:masterClrMapping/>
+  </p:clrMapOvr>
+</p:notes>
+</file>
+
+<file path=ppt/notesSlides/notesSlide5.xml><?xml version="1.0" encoding="utf-8"?>
+<p:notes xmlns:a="http://schemas.openxmlformats.org/drawingml/2006/main" xmlns:r="http://schemas.openxmlformats.org/officeDocument/2006/relationships" xmlns:p="http://schemas.openxmlformats.org/presentationml/2006/main">
+  <p:cSld>
+    <p:spTree>
+      <p:nvGrpSpPr>
+        <p:cNvPr id="1" name=""/>
+        <p:cNvGrpSpPr/>
+        <p:nvPr/>
+      </p:nvGrpSpPr>
+      <p:grpSpPr>
+        <a:xfrm>
+          <a:off x="0" y="0"/>
+          <a:ext cx="0" cy="0"/>
+          <a:chOff x="0" y="0"/>
+          <a:chExt cx="0" cy="0"/>
+        </a:xfrm>
+      </p:grpSpPr>
+      <p:sp>
+        <p:nvSpPr>
+          <p:cNvPr id="2" name="Slide Image Placeholder 1"/>
+          <p:cNvSpPr>
+            <a:spLocks noGrp="1" noRot="1" noChangeAspect="1"/>
+          </p:cNvSpPr>
+          <p:nvPr>
+            <p:ph type="sldImg"/>
+          </p:nvPr>
+        </p:nvSpPr>
+        <p:spPr/>
+      </p:sp>
+      <p:sp>
+        <p:nvSpPr>
+          <p:cNvPr id="3" name="Notes Placeholder 2"/>
+          <p:cNvSpPr>
+            <a:spLocks noGrp="1"/>
+          </p:cNvSpPr>
+          <p:nvPr>
+            <p:ph type="body" idx="1"/>
+          </p:nvPr>
+        </p:nvSpPr>
+        <p:spPr/>
+        <p:txBody>
+          <a:bodyPr/>
+          <a:lstStyle/>
+          <a:p>
+            <a:endParaRPr lang="en-US" dirty="0"/>
+          </a:p>
+        </p:txBody>
+      </p:sp>
+      <p:sp>
+        <p:nvSpPr>
+          <p:cNvPr id="4" name="Slide Number Placeholder 3"/>
+          <p:cNvSpPr>
+            <a:spLocks noGrp="1"/>
+          </p:cNvSpPr>
+          <p:nvPr>
+            <p:ph type="sldNum" sz="quarter" idx="5"/>
+          </p:nvPr>
+        </p:nvSpPr>
+        <p:spPr/>
+        <p:txBody>
+          <a:bodyPr/>
+          <a:lstStyle/>
+          <a:p>
+            <a:fld id="{A909A3FC-2393-4273-9AC7-EDC993986798}" type="slidenum">
+              <a:rPr lang="en-US" smtClean="0"/>
+              <a:t>5</a:t>
+            </a:fld>
+            <a:endParaRPr lang="en-US"/>
+          </a:p>
+        </p:txBody>
+      </p:sp>
+    </p:spTree>
+    <p:extLst>
+      <p:ext uri="{BB962C8B-B14F-4D97-AF65-F5344CB8AC3E}">
+        <p14:creationId xmlns:p14="http://schemas.microsoft.com/office/powerpoint/2010/main" val="603466729"/>
+      </p:ext>
+    </p:extLst>
+  </p:cSld>
+  <p:clrMapOvr>
+    <a:masterClrMapping/>
+  </p:clrMapOvr>
+</p:notes>
+</file>
+
 <file path=ppt/notesSlides/notesSlide6.xml><?xml version="1.0" encoding="utf-8"?>
 <p:notes xmlns:a="http://schemas.openxmlformats.org/drawingml/2006/main" xmlns:r="http://schemas.openxmlformats.org/officeDocument/2006/relationships" xmlns:p="http://schemas.openxmlformats.org/presentationml/2006/main">
   <p:cSld>
@@ -1126,17 +1217,26 @@
           <a:bodyPr/>
           <a:lstStyle/>
           <a:p>
+            <a:pPr marL="0" marR="0">
+              <a:lnSpc>
+                <a:spcPct val="107000"/>
+              </a:lnSpc>
+              <a:spcBef>
+                <a:spcPts val="0"/>
+              </a:spcBef>
+              <a:spcAft>
+                <a:spcPts val="800"/>
+              </a:spcAft>
+            </a:pPr>
             <a:r>
-              <a:rPr lang="en-US" b="0" i="0" dirty="0">
-                <a:solidFill>
-                  <a:srgbClr val="ECECEC"/>
-                </a:solidFill>
+              <a:rPr lang="en-US" sz="1800" kern="100" dirty="0">
                 <a:effectLst/>
-                <a:latin typeface="Söhne"/>
+                <a:latin typeface="Calibri" panose="020F0502020204030204" pitchFamily="34" charset="0"/>
+                <a:ea typeface="Calibri" panose="020F0502020204030204" pitchFamily="34" charset="0"/>
+                <a:cs typeface="Times New Roman" panose="02020603050405020304" pitchFamily="18" charset="0"/>
               </a:rPr>
-              <a:t>Through the completion of various projects spanning different domains such as analytics, data science, and weather forecasting, I have gained valuable insights and skills that directly align with my learning requirements. These projects have enabled me to proficiently collect, clean, and analyze diverse datasets using programming languages like R and Python, fulfilling the need to leverage applicable technologies for data manipulation and analysis. By applying visualization techniques and predictive models, I have successfully generated actionable insights across different contexts, from societal issues like honeybee population decline to business analytics in predicting data science salaries. Additionally, communicating these insights effectively to diverse audiences, including project sponsors and technical team leads, has been a crucial aspect of these projects, contributing to my ability to articulate findings clearly and persuasively. Furthermore, these projects have underscored the importance of ethical considerations in the development and use of data and predictive models, ensuring fairness, transparency, and privacy in my analyses. Overall, these projects have provided me with a comprehensive understanding of the data science lifecycle, from data collection to prediction, and have equipped me with the skills and knowledge necessary to address real-world challenges across various domains while upholding ethical standards.</a:t>
+              <a:t>The health insurance charge project effectively fulfilled my learning requirements across multiple dimensions of data science. Demonstrating proficiency in data handling, I collected, stored, and accessed data, identifying dataset demographics and assessing the need for cleaning. Despite dataset limitations, I successfully extracted actionable insights regarding variables impacting insurance charges, showcasing my ability to generate insights across different contexts. Through regression modeling and visualization techniques, I was able to analyze the data to identify significant variables and convey insights visually, while also applying programming skills in R for data manipulation and model creation. By creating a Shiny app and developing a prediction function, I communicated insights to a broad audience, including non-technical users, thus meeting the requirement for communication. Though not explicitly mentioned, ethical considerations were taken into account, aligning with the need to apply ethics in data and predictive models. Overall, my project encompassed the entire data science life cycle, demonstrating the ability to handle data, derive insights, apply various techniques, communicate findings effectively, and consider ethical implications. </a:t>
             </a:r>
-            <a:endParaRPr lang="en-US" dirty="0"/>
           </a:p>
         </p:txBody>
       </p:sp>
@@ -1157,7 +1257,7 @@
           <a:p>
             <a:fld id="{A909A3FC-2393-4273-9AC7-EDC993986798}" type="slidenum">
               <a:rPr lang="en-US" smtClean="0"/>
-              <a:t>11</a:t>
+              <a:t>6</a:t>
             </a:fld>
             <a:endParaRPr lang="en-US"/>
           </a:p>
@@ -1166,7 +1266,358 @@
     </p:spTree>
     <p:extLst>
       <p:ext uri="{BB962C8B-B14F-4D97-AF65-F5344CB8AC3E}">
-        <p14:creationId xmlns:p14="http://schemas.microsoft.com/office/powerpoint/2010/main" val="2249626278"/>
+        <p14:creationId xmlns:p14="http://schemas.microsoft.com/office/powerpoint/2010/main" val="2003929635"/>
+      </p:ext>
+    </p:extLst>
+  </p:cSld>
+  <p:clrMapOvr>
+    <a:masterClrMapping/>
+  </p:clrMapOvr>
+</p:notes>
+</file>
+
+<file path=ppt/notesSlides/notesSlide7.xml><?xml version="1.0" encoding="utf-8"?>
+<p:notes xmlns:a="http://schemas.openxmlformats.org/drawingml/2006/main" xmlns:r="http://schemas.openxmlformats.org/officeDocument/2006/relationships" xmlns:p="http://schemas.openxmlformats.org/presentationml/2006/main">
+  <p:cSld>
+    <p:spTree>
+      <p:nvGrpSpPr>
+        <p:cNvPr id="1" name=""/>
+        <p:cNvGrpSpPr/>
+        <p:nvPr/>
+      </p:nvGrpSpPr>
+      <p:grpSpPr>
+        <a:xfrm>
+          <a:off x="0" y="0"/>
+          <a:ext cx="0" cy="0"/>
+          <a:chOff x="0" y="0"/>
+          <a:chExt cx="0" cy="0"/>
+        </a:xfrm>
+      </p:grpSpPr>
+      <p:sp>
+        <p:nvSpPr>
+          <p:cNvPr id="2" name="Slide Image Placeholder 1"/>
+          <p:cNvSpPr>
+            <a:spLocks noGrp="1" noRot="1" noChangeAspect="1"/>
+          </p:cNvSpPr>
+          <p:nvPr>
+            <p:ph type="sldImg"/>
+          </p:nvPr>
+        </p:nvSpPr>
+        <p:spPr/>
+      </p:sp>
+      <p:sp>
+        <p:nvSpPr>
+          <p:cNvPr id="3" name="Notes Placeholder 2"/>
+          <p:cNvSpPr>
+            <a:spLocks noGrp="1"/>
+          </p:cNvSpPr>
+          <p:nvPr>
+            <p:ph type="body" idx="1"/>
+          </p:nvPr>
+        </p:nvSpPr>
+        <p:spPr/>
+        <p:txBody>
+          <a:bodyPr/>
+          <a:lstStyle/>
+          <a:p>
+            <a:pPr marL="0" marR="0" lvl="0" indent="0" algn="l" defTabSz="914400" rtl="0" eaLnBrk="1" fontAlgn="auto" latinLnBrk="0" hangingPunct="1">
+              <a:lnSpc>
+                <a:spcPct val="100000"/>
+              </a:lnSpc>
+              <a:spcBef>
+                <a:spcPts val="0"/>
+              </a:spcBef>
+              <a:spcAft>
+                <a:spcPts val="0"/>
+              </a:spcAft>
+              <a:buClrTx/>
+              <a:buSzTx/>
+              <a:buFontTx/>
+              <a:buNone/>
+              <a:tabLst/>
+              <a:defRPr/>
+            </a:pPr>
+            <a:r>
+              <a:rPr lang="en-US" sz="1800" kern="100" dirty="0">
+                <a:effectLst/>
+                <a:latin typeface="Calibri" panose="020F0502020204030204" pitchFamily="34" charset="0"/>
+                <a:ea typeface="Calibri" panose="020F0502020204030204" pitchFamily="34" charset="0"/>
+                <a:cs typeface="Times New Roman" panose="02020603050405020304" pitchFamily="18" charset="0"/>
+              </a:rPr>
+              <a:t>This project centered on analyzing two Airbnb datasets from Kaggle, this project met my learning requirements in several key aspects. Beginning with data handling and management, I was able to efficiently process the datasets, distinguishing between the AB_US and Combined Europe datasets and managing their large size by creating a sampled version for analysis. Utilizing </a:t>
+            </a:r>
+            <a:r>
+              <a:rPr lang="en-US" sz="1800" kern="100" dirty="0" err="1">
+                <a:effectLst/>
+                <a:latin typeface="Calibri" panose="020F0502020204030204" pitchFamily="34" charset="0"/>
+                <a:ea typeface="Calibri" panose="020F0502020204030204" pitchFamily="34" charset="0"/>
+                <a:cs typeface="Times New Roman" panose="02020603050405020304" pitchFamily="18" charset="0"/>
+              </a:rPr>
+              <a:t>Jupyter</a:t>
+            </a:r>
+            <a:r>
+              <a:rPr lang="en-US" sz="1800" kern="100" dirty="0">
+                <a:effectLst/>
+                <a:latin typeface="Calibri" panose="020F0502020204030204" pitchFamily="34" charset="0"/>
+                <a:ea typeface="Calibri" panose="020F0502020204030204" pitchFamily="34" charset="0"/>
+                <a:cs typeface="Times New Roman" panose="02020603050405020304" pitchFamily="18" charset="0"/>
+              </a:rPr>
+              <a:t> notebooks, I organized the data into separate data frames for analysis. Through data cleaning and manipulation, I ensured that only relevant columns were retained and appropriately renamed for clarity, exemplifying proficiency in data preprocessing. Employing descriptive statistics, scatter plots, correlation analysis, and pivot tables, I explored the relationships between variables such as price, location, and customer satisfaction, demonstrating a comprehensive understanding and application of visualization and analytical techniques. Furthermore, I effectively communicated the project findings and insights, drawing conclusions about Airbnb rental trends in different geographical contexts, such as the impact of location proximity to metro stations on rental types in Europe and the influence of city, availability, and price on rental bookings and customer satisfaction. Overall, this project showcases the data science principles and techniques, aligning closely with the learning requirements and showcasing my ability to derive actionable insights from complex datasets.</a:t>
+            </a:r>
+          </a:p>
+          <a:p>
+            <a:endParaRPr lang="en-US" dirty="0"/>
+          </a:p>
+        </p:txBody>
+      </p:sp>
+      <p:sp>
+        <p:nvSpPr>
+          <p:cNvPr id="4" name="Slide Number Placeholder 3"/>
+          <p:cNvSpPr>
+            <a:spLocks noGrp="1"/>
+          </p:cNvSpPr>
+          <p:nvPr>
+            <p:ph type="sldNum" sz="quarter" idx="5"/>
+          </p:nvPr>
+        </p:nvSpPr>
+        <p:spPr/>
+        <p:txBody>
+          <a:bodyPr/>
+          <a:lstStyle/>
+          <a:p>
+            <a:fld id="{A909A3FC-2393-4273-9AC7-EDC993986798}" type="slidenum">
+              <a:rPr lang="en-US" smtClean="0"/>
+              <a:t>7</a:t>
+            </a:fld>
+            <a:endParaRPr lang="en-US"/>
+          </a:p>
+        </p:txBody>
+      </p:sp>
+    </p:spTree>
+    <p:extLst>
+      <p:ext uri="{BB962C8B-B14F-4D97-AF65-F5344CB8AC3E}">
+        <p14:creationId xmlns:p14="http://schemas.microsoft.com/office/powerpoint/2010/main" val="1322968924"/>
+      </p:ext>
+    </p:extLst>
+  </p:cSld>
+  <p:clrMapOvr>
+    <a:masterClrMapping/>
+  </p:clrMapOvr>
+</p:notes>
+</file>
+
+<file path=ppt/notesSlides/notesSlide8.xml><?xml version="1.0" encoding="utf-8"?>
+<p:notes xmlns:a="http://schemas.openxmlformats.org/drawingml/2006/main" xmlns:r="http://schemas.openxmlformats.org/officeDocument/2006/relationships" xmlns:p="http://schemas.openxmlformats.org/presentationml/2006/main">
+  <p:cSld>
+    <p:spTree>
+      <p:nvGrpSpPr>
+        <p:cNvPr id="1" name=""/>
+        <p:cNvGrpSpPr/>
+        <p:nvPr/>
+      </p:nvGrpSpPr>
+      <p:grpSpPr>
+        <a:xfrm>
+          <a:off x="0" y="0"/>
+          <a:ext cx="0" cy="0"/>
+          <a:chOff x="0" y="0"/>
+          <a:chExt cx="0" cy="0"/>
+        </a:xfrm>
+      </p:grpSpPr>
+      <p:sp>
+        <p:nvSpPr>
+          <p:cNvPr id="2" name="Slide Image Placeholder 1"/>
+          <p:cNvSpPr>
+            <a:spLocks noGrp="1" noRot="1" noChangeAspect="1"/>
+          </p:cNvSpPr>
+          <p:nvPr>
+            <p:ph type="sldImg"/>
+          </p:nvPr>
+        </p:nvSpPr>
+        <p:spPr/>
+      </p:sp>
+      <p:sp>
+        <p:nvSpPr>
+          <p:cNvPr id="3" name="Notes Placeholder 2"/>
+          <p:cNvSpPr>
+            <a:spLocks noGrp="1"/>
+          </p:cNvSpPr>
+          <p:nvPr>
+            <p:ph type="body" idx="1"/>
+          </p:nvPr>
+        </p:nvSpPr>
+        <p:spPr/>
+        <p:txBody>
+          <a:bodyPr/>
+          <a:lstStyle/>
+          <a:p>
+            <a:pPr marL="0" marR="0" lvl="0" indent="0" algn="l" defTabSz="914400" rtl="0" eaLnBrk="1" fontAlgn="auto" latinLnBrk="0" hangingPunct="1">
+              <a:lnSpc>
+                <a:spcPct val="100000"/>
+              </a:lnSpc>
+              <a:spcBef>
+                <a:spcPts val="0"/>
+              </a:spcBef>
+              <a:spcAft>
+                <a:spcPts val="0"/>
+              </a:spcAft>
+              <a:buClrTx/>
+              <a:buSzTx/>
+              <a:buFontTx/>
+              <a:buNone/>
+              <a:tabLst/>
+              <a:defRPr/>
+            </a:pPr>
+            <a:r>
+              <a:rPr lang="en-US" sz="1800" kern="100" dirty="0">
+                <a:effectLst/>
+                <a:latin typeface="Calibri" panose="020F0502020204030204" pitchFamily="34" charset="0"/>
+                <a:ea typeface="Calibri" panose="020F0502020204030204" pitchFamily="34" charset="0"/>
+                <a:cs typeface="Times New Roman" panose="02020603050405020304" pitchFamily="18" charset="0"/>
+              </a:rPr>
+              <a:t>For my Machine Learning project, I focused on analyzing a dataset of Data Science salaries from 2019 to 2022 sourced from Kaggle, this project helped to demonstrate my ability to use multiple analysis methods to predict future salaries and inform negotiation strategies for Data Scientist roles. Despite encountering challenges with the initial dataset, which necessitated the use of a replacement dataset, I was able to prepare the data, ensuring it was clean and structured for analysis in R. Through descriptive statistics, I gained insights into the distribution and trends of salaries across different years, identifying notable increases in mean salaries over time. Utilizing visualization techniques such as histograms, density charts, and word clouds, I was further able to explain salary distributions and key terms in job descriptions. Moving into data mining, I  applied probability tables and machine learning models such as Naïve Bayes and decision trees to predict future salaries and determine optimal negotiation strategies. The analysis revealed steady increases in Data Scientist salaries year over year, with significant variations in average salaries across cities. Ultimately, the prediction analysis suggests a negotiated salary range for 2023 between $124,671 and $134,671, providing valuable insights for individuals seeking Data Science roles. Overall, this project demonstrates a comprehensive application of data science techniques to address real-world questions and inform decision-making in a professional manner.</a:t>
+            </a:r>
+          </a:p>
+        </p:txBody>
+      </p:sp>
+      <p:sp>
+        <p:nvSpPr>
+          <p:cNvPr id="4" name="Slide Number Placeholder 3"/>
+          <p:cNvSpPr>
+            <a:spLocks noGrp="1"/>
+          </p:cNvSpPr>
+          <p:nvPr>
+            <p:ph type="sldNum" sz="quarter" idx="5"/>
+          </p:nvPr>
+        </p:nvSpPr>
+        <p:spPr/>
+        <p:txBody>
+          <a:bodyPr/>
+          <a:lstStyle/>
+          <a:p>
+            <a:fld id="{A909A3FC-2393-4273-9AC7-EDC993986798}" type="slidenum">
+              <a:rPr lang="en-US" smtClean="0"/>
+              <a:t>8</a:t>
+            </a:fld>
+            <a:endParaRPr lang="en-US"/>
+          </a:p>
+        </p:txBody>
+      </p:sp>
+    </p:spTree>
+    <p:extLst>
+      <p:ext uri="{BB962C8B-B14F-4D97-AF65-F5344CB8AC3E}">
+        <p14:creationId xmlns:p14="http://schemas.microsoft.com/office/powerpoint/2010/main" val="1715172633"/>
+      </p:ext>
+    </p:extLst>
+  </p:cSld>
+  <p:clrMapOvr>
+    <a:masterClrMapping/>
+  </p:clrMapOvr>
+</p:notes>
+</file>
+
+<file path=ppt/notesSlides/notesSlide9.xml><?xml version="1.0" encoding="utf-8"?>
+<p:notes xmlns:a="http://schemas.openxmlformats.org/drawingml/2006/main" xmlns:r="http://schemas.openxmlformats.org/officeDocument/2006/relationships" xmlns:p="http://schemas.openxmlformats.org/presentationml/2006/main">
+  <p:cSld>
+    <p:spTree>
+      <p:nvGrpSpPr>
+        <p:cNvPr id="1" name=""/>
+        <p:cNvGrpSpPr/>
+        <p:nvPr/>
+      </p:nvGrpSpPr>
+      <p:grpSpPr>
+        <a:xfrm>
+          <a:off x="0" y="0"/>
+          <a:ext cx="0" cy="0"/>
+          <a:chOff x="0" y="0"/>
+          <a:chExt cx="0" cy="0"/>
+        </a:xfrm>
+      </p:grpSpPr>
+      <p:sp>
+        <p:nvSpPr>
+          <p:cNvPr id="2" name="Slide Image Placeholder 1"/>
+          <p:cNvSpPr>
+            <a:spLocks noGrp="1" noRot="1" noChangeAspect="1"/>
+          </p:cNvSpPr>
+          <p:nvPr>
+            <p:ph type="sldImg"/>
+          </p:nvPr>
+        </p:nvSpPr>
+        <p:spPr/>
+      </p:sp>
+      <p:sp>
+        <p:nvSpPr>
+          <p:cNvPr id="3" name="Notes Placeholder 2"/>
+          <p:cNvSpPr>
+            <a:spLocks noGrp="1"/>
+          </p:cNvSpPr>
+          <p:nvPr>
+            <p:ph type="body" idx="1"/>
+          </p:nvPr>
+        </p:nvSpPr>
+        <p:spPr/>
+        <p:txBody>
+          <a:bodyPr/>
+          <a:lstStyle/>
+          <a:p>
+            <a:pPr marL="0" marR="0" lvl="0" indent="0" algn="l" defTabSz="914400" rtl="0" eaLnBrk="1" fontAlgn="auto" latinLnBrk="0" hangingPunct="1">
+              <a:lnSpc>
+                <a:spcPct val="100000"/>
+              </a:lnSpc>
+              <a:spcBef>
+                <a:spcPts val="0"/>
+              </a:spcBef>
+              <a:spcAft>
+                <a:spcPts val="0"/>
+              </a:spcAft>
+              <a:buClrTx/>
+              <a:buSzTx/>
+              <a:buFontTx/>
+              <a:buNone/>
+              <a:tabLst/>
+              <a:defRPr/>
+            </a:pPr>
+            <a:r>
+              <a:rPr lang="en-US" sz="1800" kern="100" dirty="0">
+                <a:effectLst/>
+                <a:latin typeface="Calibri" panose="020F0502020204030204" pitchFamily="34" charset="0"/>
+                <a:ea typeface="Calibri" panose="020F0502020204030204" pitchFamily="34" charset="0"/>
+                <a:cs typeface="Times New Roman" panose="02020603050405020304" pitchFamily="18" charset="0"/>
+              </a:rPr>
+              <a:t>For the Big Data Analytics class my project centered on the analysis of two datasets regarding honeybee production and colony loss, effectively addressing critical issues related to declining bee populations and its implications. Through meticulous examination, it was observed that the overall number of colonies, honeybee production, and beekeepers are experiencing a consistent decline, posing significant ecological concerns. To address these challenges, a recommendation is proposed to allocate funding for incentivizing beekeeping and bee-saving initiatives, aiming to bolster beekeeping efforts and mitigate colony losses. By enhancing the quantity and quality of beekeeping practices, it is anticipated that the number of colonies and honey production can be positively impacted. Furthermore, considering the correlation between production levels and honey prices, such incentives could lead to potential cost reductions in the future. The project's research questions encompass various aspects, including trends in colony loss, honey production, price fluctuations, and predictive analysis by state. Hypotheses were formulated to explore these questions, anticipating trends such as increasing colony losses and declining honey production over time. Two datasets were utilized, retrieved from Kaggle, each providing valuable insights into colony loss, honey production, and related factors across different states and years. Notable findings include the prevalence of colony loss and declining honey production trends, particularly evident from 2011 to 2017. Despite challenges in fitting ARIMA models for predictive analysis, the project still discerned significant trends, indicating the likelihood of continued colony losses and their far-reaching consequences. Ultimately, the recommendation for funding incentivized beekeeping initiatives emerges as a crucial step towards safeguarding the bee population and maintaining a healthy ecosystem. Through this proactive approach, the project underscores the importance of collective efforts in addressing the pressing issue of declining bee populations and its broader ecological impact. My project encompasses various aspects of data analysis, visualization, prediction, and communication, showcasing proficiency in addressing real-world problems using R while considering ethical implications and communicating findings effectively to stakeholders.</a:t>
+            </a:r>
+          </a:p>
+          <a:p>
+            <a:endParaRPr lang="en-US" dirty="0"/>
+          </a:p>
+        </p:txBody>
+      </p:sp>
+      <p:sp>
+        <p:nvSpPr>
+          <p:cNvPr id="4" name="Slide Number Placeholder 3"/>
+          <p:cNvSpPr>
+            <a:spLocks noGrp="1"/>
+          </p:cNvSpPr>
+          <p:nvPr>
+            <p:ph type="sldNum" sz="quarter" idx="5"/>
+          </p:nvPr>
+        </p:nvSpPr>
+        <p:spPr/>
+        <p:txBody>
+          <a:bodyPr/>
+          <a:lstStyle/>
+          <a:p>
+            <a:fld id="{A909A3FC-2393-4273-9AC7-EDC993986798}" type="slidenum">
+              <a:rPr lang="en-US" smtClean="0"/>
+              <a:t>9</a:t>
+            </a:fld>
+            <a:endParaRPr lang="en-US"/>
+          </a:p>
+        </p:txBody>
+      </p:sp>
+    </p:spTree>
+    <p:extLst>
+      <p:ext uri="{BB962C8B-B14F-4D97-AF65-F5344CB8AC3E}">
+        <p14:creationId xmlns:p14="http://schemas.microsoft.com/office/powerpoint/2010/main" val="3388718160"/>
       </p:ext>
     </p:extLst>
   </p:cSld>
@@ -1323,7 +1774,7 @@
           <a:p>
             <a:fld id="{DC4C5412-FA81-4E63-8A72-237CF1BF03B2}" type="datetimeFigureOut">
               <a:rPr lang="en-US" smtClean="0"/>
-              <a:t>2/22/2024</a:t>
+              <a:t>3/8/2024</a:t>
             </a:fld>
             <a:endParaRPr lang="en-US"/>
           </a:p>
@@ -1521,7 +1972,7 @@
           <a:p>
             <a:fld id="{DC4C5412-FA81-4E63-8A72-237CF1BF03B2}" type="datetimeFigureOut">
               <a:rPr lang="en-US" smtClean="0"/>
-              <a:t>2/22/2024</a:t>
+              <a:t>3/8/2024</a:t>
             </a:fld>
             <a:endParaRPr lang="en-US"/>
           </a:p>
@@ -1729,7 +2180,7 @@
           <a:p>
             <a:fld id="{DC4C5412-FA81-4E63-8A72-237CF1BF03B2}" type="datetimeFigureOut">
               <a:rPr lang="en-US" smtClean="0"/>
-              <a:t>2/22/2024</a:t>
+              <a:t>3/8/2024</a:t>
             </a:fld>
             <a:endParaRPr lang="en-US"/>
           </a:p>
@@ -1927,7 +2378,7 @@
           <a:p>
             <a:fld id="{DC4C5412-FA81-4E63-8A72-237CF1BF03B2}" type="datetimeFigureOut">
               <a:rPr lang="en-US" smtClean="0"/>
-              <a:t>2/22/2024</a:t>
+              <a:t>3/8/2024</a:t>
             </a:fld>
             <a:endParaRPr lang="en-US"/>
           </a:p>
@@ -2202,7 +2653,7 @@
           <a:p>
             <a:fld id="{DC4C5412-FA81-4E63-8A72-237CF1BF03B2}" type="datetimeFigureOut">
               <a:rPr lang="en-US" smtClean="0"/>
-              <a:t>2/22/2024</a:t>
+              <a:t>3/8/2024</a:t>
             </a:fld>
             <a:endParaRPr lang="en-US"/>
           </a:p>
@@ -2467,7 +2918,7 @@
           <a:p>
             <a:fld id="{DC4C5412-FA81-4E63-8A72-237CF1BF03B2}" type="datetimeFigureOut">
               <a:rPr lang="en-US" smtClean="0"/>
-              <a:t>2/22/2024</a:t>
+              <a:t>3/8/2024</a:t>
             </a:fld>
             <a:endParaRPr lang="en-US"/>
           </a:p>
@@ -2879,7 +3330,7 @@
           <a:p>
             <a:fld id="{DC4C5412-FA81-4E63-8A72-237CF1BF03B2}" type="datetimeFigureOut">
               <a:rPr lang="en-US" smtClean="0"/>
-              <a:t>2/22/2024</a:t>
+              <a:t>3/8/2024</a:t>
             </a:fld>
             <a:endParaRPr lang="en-US"/>
           </a:p>
@@ -3020,7 +3471,7 @@
           <a:p>
             <a:fld id="{DC4C5412-FA81-4E63-8A72-237CF1BF03B2}" type="datetimeFigureOut">
               <a:rPr lang="en-US" smtClean="0"/>
-              <a:t>2/22/2024</a:t>
+              <a:t>3/8/2024</a:t>
             </a:fld>
             <a:endParaRPr lang="en-US"/>
           </a:p>
@@ -3133,7 +3584,7 @@
           <a:p>
             <a:fld id="{DC4C5412-FA81-4E63-8A72-237CF1BF03B2}" type="datetimeFigureOut">
               <a:rPr lang="en-US" smtClean="0"/>
-              <a:t>2/22/2024</a:t>
+              <a:t>3/8/2024</a:t>
             </a:fld>
             <a:endParaRPr lang="en-US"/>
           </a:p>
@@ -3444,7 +3895,7 @@
           <a:p>
             <a:fld id="{DC4C5412-FA81-4E63-8A72-237CF1BF03B2}" type="datetimeFigureOut">
               <a:rPr lang="en-US" smtClean="0"/>
-              <a:t>2/22/2024</a:t>
+              <a:t>3/8/2024</a:t>
             </a:fld>
             <a:endParaRPr lang="en-US"/>
           </a:p>
@@ -3732,7 +4183,7 @@
           <a:p>
             <a:fld id="{DC4C5412-FA81-4E63-8A72-237CF1BF03B2}" type="datetimeFigureOut">
               <a:rPr lang="en-US" smtClean="0"/>
-              <a:t>2/22/2024</a:t>
+              <a:t>3/8/2024</a:t>
             </a:fld>
             <a:endParaRPr lang="en-US"/>
           </a:p>
@@ -3973,7 +4424,7 @@
           <a:p>
             <a:fld id="{DC4C5412-FA81-4E63-8A72-237CF1BF03B2}" type="datetimeFigureOut">
               <a:rPr lang="en-US" smtClean="0"/>
-              <a:t>2/22/2024</a:t>
+              <a:t>3/8/2024</a:t>
             </a:fld>
             <a:endParaRPr lang="en-US"/>
           </a:p>
@@ -4473,7 +4924,7 @@
           <p:nvPr/>
         </p:nvPicPr>
         <p:blipFill rotWithShape="1">
-          <a:blip r:embed="rId2"/>
+          <a:blip r:embed="rId3"/>
           <a:srcRect l="7701" r="7701"/>
           <a:stretch/>
         </p:blipFill>
@@ -8935,7 +9386,7 @@
               <a:rPr lang="en-US" sz="2000" b="0" i="0" dirty="0">
                 <a:effectLst/>
               </a:rPr>
-              <a:t>Having a background in computer science, exploring analytics and data science felt like a stimulating shift. The courses I engaged in and the skills I refined were pivotal in shaping my personal and academic growth. The projects and coursework have equipped me to advance in my current career, enabling me to offer more profound insights into our data. By persistently practicing and refining my skills, I am preparing myself to transition into a data science role within my company, aiming to enhance the landscape of the health insurance sector.</a:t>
+              <a:t>Having a background in computer science, exploring analytics and data science felt like an exciting transition. The courses I engaged in and the skills I refined were pivotal in shaping my personal and academic growth. The projects and coursework have equipped me to advance in my current career, enabling me to offer more profound insights into our data. By persistently practicing and refining my skills, I am preparing myself to transition into a data science role within my company.</a:t>
             </a:r>
             <a:endParaRPr lang="en-US" sz="3200" dirty="0"/>
           </a:p>
@@ -9197,13 +9648,13 @@
           <p:nvPr/>
         </p:nvPicPr>
         <p:blipFill>
-          <a:blip r:embed="rId2">
+          <a:blip r:embed="rId3">
             <a:extLst>
               <a:ext uri="{28A0092B-C50C-407E-A947-70E740481C1C}">
                 <a14:useLocalDpi xmlns:a14="http://schemas.microsoft.com/office/drawing/2010/main" val="0"/>
               </a:ext>
               <a:ext uri="{96DAC541-7B7A-43D3-8B79-37D633B846F1}">
-                <asvg:svgBlip xmlns:asvg="http://schemas.microsoft.com/office/drawing/2016/SVG/main" r:embed="rId3"/>
+                <asvg:svgBlip xmlns:asvg="http://schemas.microsoft.com/office/drawing/2016/SVG/main" r:embed="rId4"/>
               </a:ext>
             </a:extLst>
           </a:blip>
@@ -12395,7 +12846,7 @@
           <p:nvPr/>
         </p:nvPicPr>
         <p:blipFill rotWithShape="1">
-          <a:blip r:embed="rId2">
+          <a:blip r:embed="rId3">
             <a:extLst>
               <a:ext uri="{28A0092B-C50C-407E-A947-70E740481C1C}">
                 <a14:useLocalDpi xmlns:a14="http://schemas.microsoft.com/office/drawing/2010/main" val="0"/>
@@ -16061,7 +16512,7 @@
                     <a:lstStyle/>
                     <a:p>
                       <a:r>
-                        <a:rPr lang="en-US" sz="1400"/>
+                        <a:rPr lang="en-US" sz="1400" dirty="0"/>
                         <a:t>Applied Data Science Portfolio IST 782</a:t>
                       </a:r>
                     </a:p>
@@ -16211,7 +16662,7 @@
           <a:p>
             <a:pPr algn="r"/>
             <a:r>
-              <a:rPr lang="en-US" sz="3400">
+              <a:rPr lang="en-US" sz="3400" dirty="0">
                 <a:solidFill>
                   <a:schemeClr val="accent1"/>
                 </a:solidFill>

</xml_diff>